<commit_message>
Update tutorial presentation file
Replaced or modified the contents of 'Tutorial github y cfd.pptx' with updated information or slides.
</commit_message>
<xml_diff>
--- a/Tutorial github y cfd.pptx
+++ b/Tutorial github y cfd.pptx
@@ -8,6 +8,7 @@
     <p:sldId id="257" r:id="rId5"/>
     <p:sldId id="258" r:id="rId6"/>
     <p:sldId id="259" r:id="rId7"/>
+    <p:sldId id="260" r:id="rId8"/>
   </p:sldIdLst>
   <p:sldSz cx="12192000" cy="6858000"/>
   <p:notesSz cx="6858000" cy="9144000"/>
@@ -7013,6 +7014,781 @@
 </p:sld>
 </file>
 
+<file path=ppt/slides/slide4.xml><?xml version="1.0" encoding="utf-8"?>
+<p:sld xmlns:a="http://schemas.openxmlformats.org/drawingml/2006/main" xmlns:r="http://schemas.openxmlformats.org/officeDocument/2006/relationships" xmlns:p="http://schemas.openxmlformats.org/presentationml/2006/main">
+  <p:cSld>
+    <p:spTree>
+      <p:nvGrpSpPr>
+        <p:cNvPr id="1" name=""/>
+        <p:cNvGrpSpPr/>
+        <p:nvPr/>
+      </p:nvGrpSpPr>
+      <p:grpSpPr>
+        <a:xfrm>
+          <a:off x="0" y="0"/>
+          <a:ext cx="0" cy="0"/>
+          <a:chOff x="0" y="0"/>
+          <a:chExt cx="0" cy="0"/>
+        </a:xfrm>
+      </p:grpSpPr>
+      <p:sp>
+        <p:nvSpPr>
+          <p:cNvPr id="2" name="Title 1">
+            <a:extLst>
+              <a:ext uri="{FF2B5EF4-FFF2-40B4-BE49-F238E27FC236}">
+                <a16:creationId xmlns:a16="http://schemas.microsoft.com/office/drawing/2014/main" id="{23DD2344-3110-4C7C-2135-83BCB29E060B}"/>
+              </a:ext>
+            </a:extLst>
+          </p:cNvPr>
+          <p:cNvSpPr>
+            <a:spLocks noGrp="1"/>
+          </p:cNvSpPr>
+          <p:nvPr>
+            <p:ph type="title"/>
+          </p:nvPr>
+        </p:nvSpPr>
+        <p:spPr/>
+        <p:txBody>
+          <a:bodyPr/>
+          <a:lstStyle/>
+          <a:p>
+            <a:r>
+              <a:rPr lang="es-MX" dirty="0"/>
+              <a:t>Ramas</a:t>
+            </a:r>
+            <a:endParaRPr lang="en-US" dirty="0"/>
+          </a:p>
+        </p:txBody>
+      </p:sp>
+      <p:sp>
+        <p:nvSpPr>
+          <p:cNvPr id="3" name="Content Placeholder 2">
+            <a:extLst>
+              <a:ext uri="{FF2B5EF4-FFF2-40B4-BE49-F238E27FC236}">
+                <a16:creationId xmlns:a16="http://schemas.microsoft.com/office/drawing/2014/main" id="{90393DF5-BD8A-7EE2-EC7C-8E11AE8DB488}"/>
+              </a:ext>
+            </a:extLst>
+          </p:cNvPr>
+          <p:cNvSpPr>
+            <a:spLocks noGrp="1"/>
+          </p:cNvSpPr>
+          <p:nvPr>
+            <p:ph idx="1"/>
+          </p:nvPr>
+        </p:nvSpPr>
+        <p:spPr>
+          <a:xfrm>
+            <a:off x="2923032" y="410210"/>
+            <a:ext cx="8616696" cy="4351338"/>
+          </a:xfrm>
+        </p:spPr>
+        <p:txBody>
+          <a:bodyPr/>
+          <a:lstStyle/>
+          <a:p>
+            <a:pPr marL="0" indent="0">
+              <a:buNone/>
+            </a:pPr>
+            <a:r>
+              <a:rPr lang="es-MX" dirty="0"/>
+              <a:t>Copian el “</a:t>
+            </a:r>
+            <a:r>
+              <a:rPr lang="es-MX" dirty="0" err="1"/>
+              <a:t>main</a:t>
+            </a:r>
+            <a:r>
+              <a:rPr lang="es-MX" dirty="0"/>
+              <a:t>” o rama de interés para poder trabajar aparte y posteriormente juntarlas “</a:t>
+            </a:r>
+            <a:r>
+              <a:rPr lang="es-MX" dirty="0" err="1"/>
+              <a:t>merge</a:t>
+            </a:r>
+            <a:r>
+              <a:rPr lang="es-MX" dirty="0"/>
+              <a:t>” a la rama </a:t>
+            </a:r>
+            <a:r>
+              <a:rPr lang="es-MX" dirty="0" err="1"/>
+              <a:t>main</a:t>
+            </a:r>
+            <a:r>
+              <a:rPr lang="es-MX" dirty="0"/>
+              <a:t> que es la principal</a:t>
+            </a:r>
+            <a:endParaRPr lang="en-US" dirty="0"/>
+          </a:p>
+        </p:txBody>
+      </p:sp>
+      <p:pic>
+        <p:nvPicPr>
+          <p:cNvPr id="5" name="Picture 4">
+            <a:extLst>
+              <a:ext uri="{FF2B5EF4-FFF2-40B4-BE49-F238E27FC236}">
+                <a16:creationId xmlns:a16="http://schemas.microsoft.com/office/drawing/2014/main" id="{4EEA26DA-D332-28FA-0C06-26AD32731F64}"/>
+              </a:ext>
+            </a:extLst>
+          </p:cNvPr>
+          <p:cNvPicPr>
+            <a:picLocks noChangeAspect="1"/>
+          </p:cNvPicPr>
+          <p:nvPr/>
+        </p:nvPicPr>
+        <p:blipFill>
+          <a:blip r:embed="rId2"/>
+          <a:stretch>
+            <a:fillRect/>
+          </a:stretch>
+        </p:blipFill>
+        <p:spPr>
+          <a:xfrm>
+            <a:off x="652272" y="1690688"/>
+            <a:ext cx="7503801" cy="4983480"/>
+          </a:xfrm>
+          <a:prstGeom prst="rect">
+            <a:avLst/>
+          </a:prstGeom>
+        </p:spPr>
+      </p:pic>
+      <p:sp>
+        <p:nvSpPr>
+          <p:cNvPr id="6" name="Rectangle 5">
+            <a:extLst>
+              <a:ext uri="{FF2B5EF4-FFF2-40B4-BE49-F238E27FC236}">
+                <a16:creationId xmlns:a16="http://schemas.microsoft.com/office/drawing/2014/main" id="{F22540D0-B592-01E5-2C80-9E0B0AFB4C8F}"/>
+              </a:ext>
+            </a:extLst>
+          </p:cNvPr>
+          <p:cNvSpPr/>
+          <p:nvPr/>
+        </p:nvSpPr>
+        <p:spPr>
+          <a:xfrm>
+            <a:off x="4581055" y="2276916"/>
+            <a:ext cx="896202" cy="356556"/>
+          </a:xfrm>
+          <a:prstGeom prst="rect">
+            <a:avLst/>
+          </a:prstGeom>
+          <a:noFill/>
+          <a:ln w="38100">
+            <a:solidFill>
+              <a:srgbClr val="FF0000"/>
+            </a:solidFill>
+          </a:ln>
+        </p:spPr>
+        <p:style>
+          <a:lnRef idx="2">
+            <a:schemeClr val="accent1">
+              <a:shade val="15000"/>
+            </a:schemeClr>
+          </a:lnRef>
+          <a:fillRef idx="1">
+            <a:schemeClr val="accent1"/>
+          </a:fillRef>
+          <a:effectRef idx="0">
+            <a:schemeClr val="accent1"/>
+          </a:effectRef>
+          <a:fontRef idx="minor">
+            <a:schemeClr val="lt1"/>
+          </a:fontRef>
+        </p:style>
+        <p:txBody>
+          <a:bodyPr rtlCol="0" anchor="ctr"/>
+          <a:lstStyle/>
+          <a:p>
+            <a:pPr algn="ctr"/>
+            <a:endParaRPr lang="en-US"/>
+          </a:p>
+        </p:txBody>
+      </p:sp>
+      <p:sp>
+        <p:nvSpPr>
+          <p:cNvPr id="7" name="Rectangle 6">
+            <a:extLst>
+              <a:ext uri="{FF2B5EF4-FFF2-40B4-BE49-F238E27FC236}">
+                <a16:creationId xmlns:a16="http://schemas.microsoft.com/office/drawing/2014/main" id="{047ED37F-2795-383D-DDBE-917A0C86797C}"/>
+              </a:ext>
+            </a:extLst>
+          </p:cNvPr>
+          <p:cNvSpPr/>
+          <p:nvPr/>
+        </p:nvSpPr>
+        <p:spPr>
+          <a:xfrm>
+            <a:off x="2474931" y="3250722"/>
+            <a:ext cx="3002326" cy="425166"/>
+          </a:xfrm>
+          <a:prstGeom prst="rect">
+            <a:avLst/>
+          </a:prstGeom>
+          <a:noFill/>
+          <a:ln w="38100">
+            <a:solidFill>
+              <a:srgbClr val="FF0000"/>
+            </a:solidFill>
+          </a:ln>
+        </p:spPr>
+        <p:style>
+          <a:lnRef idx="2">
+            <a:schemeClr val="accent1">
+              <a:shade val="15000"/>
+            </a:schemeClr>
+          </a:lnRef>
+          <a:fillRef idx="1">
+            <a:schemeClr val="accent1"/>
+          </a:fillRef>
+          <a:effectRef idx="0">
+            <a:schemeClr val="accent1"/>
+          </a:effectRef>
+          <a:fontRef idx="minor">
+            <a:schemeClr val="lt1"/>
+          </a:fontRef>
+        </p:style>
+        <p:txBody>
+          <a:bodyPr rtlCol="0" anchor="ctr"/>
+          <a:lstStyle/>
+          <a:p>
+            <a:pPr algn="ctr"/>
+            <a:endParaRPr lang="en-US"/>
+          </a:p>
+        </p:txBody>
+      </p:sp>
+      <p:sp>
+        <p:nvSpPr>
+          <p:cNvPr id="8" name="Rectangle 7">
+            <a:extLst>
+              <a:ext uri="{FF2B5EF4-FFF2-40B4-BE49-F238E27FC236}">
+                <a16:creationId xmlns:a16="http://schemas.microsoft.com/office/drawing/2014/main" id="{9882A067-82F2-C610-6203-8ED7FAA14157}"/>
+              </a:ext>
+            </a:extLst>
+          </p:cNvPr>
+          <p:cNvSpPr/>
+          <p:nvPr/>
+        </p:nvSpPr>
+        <p:spPr>
+          <a:xfrm>
+            <a:off x="2599899" y="6235206"/>
+            <a:ext cx="2877358" cy="549641"/>
+          </a:xfrm>
+          <a:prstGeom prst="rect">
+            <a:avLst/>
+          </a:prstGeom>
+          <a:noFill/>
+          <a:ln w="38100">
+            <a:solidFill>
+              <a:srgbClr val="FF0000"/>
+            </a:solidFill>
+          </a:ln>
+        </p:spPr>
+        <p:style>
+          <a:lnRef idx="2">
+            <a:schemeClr val="accent1">
+              <a:shade val="15000"/>
+            </a:schemeClr>
+          </a:lnRef>
+          <a:fillRef idx="1">
+            <a:schemeClr val="accent1"/>
+          </a:fillRef>
+          <a:effectRef idx="0">
+            <a:schemeClr val="accent1"/>
+          </a:effectRef>
+          <a:fontRef idx="minor">
+            <a:schemeClr val="lt1"/>
+          </a:fontRef>
+        </p:style>
+        <p:txBody>
+          <a:bodyPr rtlCol="0" anchor="ctr"/>
+          <a:lstStyle/>
+          <a:p>
+            <a:pPr algn="ctr"/>
+            <a:endParaRPr lang="en-US"/>
+          </a:p>
+        </p:txBody>
+      </p:sp>
+      <p:sp>
+        <p:nvSpPr>
+          <p:cNvPr id="9" name="Oval 8">
+            <a:extLst>
+              <a:ext uri="{FF2B5EF4-FFF2-40B4-BE49-F238E27FC236}">
+                <a16:creationId xmlns:a16="http://schemas.microsoft.com/office/drawing/2014/main" id="{4A087895-F5CE-4EE6-9B50-559F7CDF5D63}"/>
+              </a:ext>
+            </a:extLst>
+          </p:cNvPr>
+          <p:cNvSpPr/>
+          <p:nvPr/>
+        </p:nvSpPr>
+        <p:spPr>
+          <a:xfrm>
+            <a:off x="5477257" y="2496788"/>
+            <a:ext cx="384048" cy="384048"/>
+          </a:xfrm>
+          <a:prstGeom prst="ellipse">
+            <a:avLst/>
+          </a:prstGeom>
+        </p:spPr>
+        <p:style>
+          <a:lnRef idx="2">
+            <a:schemeClr val="accent1">
+              <a:shade val="15000"/>
+            </a:schemeClr>
+          </a:lnRef>
+          <a:fillRef idx="1">
+            <a:schemeClr val="accent1"/>
+          </a:fillRef>
+          <a:effectRef idx="0">
+            <a:schemeClr val="accent1"/>
+          </a:effectRef>
+          <a:fontRef idx="minor">
+            <a:schemeClr val="lt1"/>
+          </a:fontRef>
+        </p:style>
+        <p:txBody>
+          <a:bodyPr rtlCol="0" anchor="ctr"/>
+          <a:lstStyle/>
+          <a:p>
+            <a:pPr algn="ctr"/>
+            <a:r>
+              <a:rPr lang="es-MX" dirty="0"/>
+              <a:t>1</a:t>
+            </a:r>
+            <a:endParaRPr lang="en-US" dirty="0"/>
+          </a:p>
+        </p:txBody>
+      </p:sp>
+      <p:sp>
+        <p:nvSpPr>
+          <p:cNvPr id="10" name="Oval 9">
+            <a:extLst>
+              <a:ext uri="{FF2B5EF4-FFF2-40B4-BE49-F238E27FC236}">
+                <a16:creationId xmlns:a16="http://schemas.microsoft.com/office/drawing/2014/main" id="{00747A22-801B-25E6-4B87-4BF764AD7799}"/>
+              </a:ext>
+            </a:extLst>
+          </p:cNvPr>
+          <p:cNvSpPr/>
+          <p:nvPr/>
+        </p:nvSpPr>
+        <p:spPr>
+          <a:xfrm>
+            <a:off x="2282907" y="2997804"/>
+            <a:ext cx="384048" cy="384048"/>
+          </a:xfrm>
+          <a:prstGeom prst="ellipse">
+            <a:avLst/>
+          </a:prstGeom>
+        </p:spPr>
+        <p:style>
+          <a:lnRef idx="2">
+            <a:schemeClr val="accent1">
+              <a:shade val="15000"/>
+            </a:schemeClr>
+          </a:lnRef>
+          <a:fillRef idx="1">
+            <a:schemeClr val="accent1"/>
+          </a:fillRef>
+          <a:effectRef idx="0">
+            <a:schemeClr val="accent1"/>
+          </a:effectRef>
+          <a:fontRef idx="minor">
+            <a:schemeClr val="lt1"/>
+          </a:fontRef>
+        </p:style>
+        <p:txBody>
+          <a:bodyPr rtlCol="0" anchor="ctr"/>
+          <a:lstStyle/>
+          <a:p>
+            <a:pPr algn="ctr"/>
+            <a:r>
+              <a:rPr lang="es-MX" dirty="0"/>
+              <a:t>2</a:t>
+            </a:r>
+            <a:endParaRPr lang="en-US" dirty="0"/>
+          </a:p>
+        </p:txBody>
+      </p:sp>
+      <p:sp>
+        <p:nvSpPr>
+          <p:cNvPr id="11" name="Oval 10">
+            <a:extLst>
+              <a:ext uri="{FF2B5EF4-FFF2-40B4-BE49-F238E27FC236}">
+                <a16:creationId xmlns:a16="http://schemas.microsoft.com/office/drawing/2014/main" id="{249D5D7B-00F7-8F93-5581-CEB5D27A5EB0}"/>
+              </a:ext>
+            </a:extLst>
+          </p:cNvPr>
+          <p:cNvSpPr/>
+          <p:nvPr/>
+        </p:nvSpPr>
+        <p:spPr>
+          <a:xfrm>
+            <a:off x="2298102" y="5941170"/>
+            <a:ext cx="384048" cy="384048"/>
+          </a:xfrm>
+          <a:prstGeom prst="ellipse">
+            <a:avLst/>
+          </a:prstGeom>
+        </p:spPr>
+        <p:style>
+          <a:lnRef idx="2">
+            <a:schemeClr val="accent1">
+              <a:shade val="15000"/>
+            </a:schemeClr>
+          </a:lnRef>
+          <a:fillRef idx="1">
+            <a:schemeClr val="accent1"/>
+          </a:fillRef>
+          <a:effectRef idx="0">
+            <a:schemeClr val="accent1"/>
+          </a:effectRef>
+          <a:fontRef idx="minor">
+            <a:schemeClr val="lt1"/>
+          </a:fontRef>
+        </p:style>
+        <p:txBody>
+          <a:bodyPr rtlCol="0" anchor="ctr"/>
+          <a:lstStyle/>
+          <a:p>
+            <a:pPr algn="ctr"/>
+            <a:r>
+              <a:rPr lang="es-MX" dirty="0"/>
+              <a:t>3</a:t>
+            </a:r>
+            <a:endParaRPr lang="en-US" dirty="0"/>
+          </a:p>
+        </p:txBody>
+      </p:sp>
+      <p:sp>
+        <p:nvSpPr>
+          <p:cNvPr id="12" name="Rectangle 11">
+            <a:extLst>
+              <a:ext uri="{FF2B5EF4-FFF2-40B4-BE49-F238E27FC236}">
+                <a16:creationId xmlns:a16="http://schemas.microsoft.com/office/drawing/2014/main" id="{CDDE29DA-2B75-85F6-21A4-B3668A390CA4}"/>
+              </a:ext>
+            </a:extLst>
+          </p:cNvPr>
+          <p:cNvSpPr/>
+          <p:nvPr/>
+        </p:nvSpPr>
+        <p:spPr>
+          <a:xfrm>
+            <a:off x="5925358" y="2318503"/>
+            <a:ext cx="1636731" cy="562333"/>
+          </a:xfrm>
+          <a:prstGeom prst="rect">
+            <a:avLst/>
+          </a:prstGeom>
+        </p:spPr>
+        <p:style>
+          <a:lnRef idx="2">
+            <a:schemeClr val="accent1">
+              <a:shade val="15000"/>
+            </a:schemeClr>
+          </a:lnRef>
+          <a:fillRef idx="1">
+            <a:schemeClr val="accent1"/>
+          </a:fillRef>
+          <a:effectRef idx="0">
+            <a:schemeClr val="accent1"/>
+          </a:effectRef>
+          <a:fontRef idx="minor">
+            <a:schemeClr val="lt1"/>
+          </a:fontRef>
+        </p:style>
+        <p:txBody>
+          <a:bodyPr rtlCol="0" anchor="ctr"/>
+          <a:lstStyle/>
+          <a:p>
+            <a:pPr algn="ctr"/>
+            <a:r>
+              <a:rPr lang="es-MX" dirty="0"/>
+              <a:t>Creas la rama</a:t>
+            </a:r>
+            <a:endParaRPr lang="en-US" dirty="0"/>
+          </a:p>
+        </p:txBody>
+      </p:sp>
+      <p:sp>
+        <p:nvSpPr>
+          <p:cNvPr id="13" name="Rectangle 12">
+            <a:extLst>
+              <a:ext uri="{FF2B5EF4-FFF2-40B4-BE49-F238E27FC236}">
+                <a16:creationId xmlns:a16="http://schemas.microsoft.com/office/drawing/2014/main" id="{57F0DC7F-1055-CDB8-27ED-01B785251713}"/>
+              </a:ext>
+            </a:extLst>
+          </p:cNvPr>
+          <p:cNvSpPr/>
+          <p:nvPr/>
+        </p:nvSpPr>
+        <p:spPr>
+          <a:xfrm>
+            <a:off x="5532353" y="3182138"/>
+            <a:ext cx="3373903" cy="1325563"/>
+          </a:xfrm>
+          <a:prstGeom prst="rect">
+            <a:avLst/>
+          </a:prstGeom>
+        </p:spPr>
+        <p:style>
+          <a:lnRef idx="2">
+            <a:schemeClr val="accent1">
+              <a:shade val="15000"/>
+            </a:schemeClr>
+          </a:lnRef>
+          <a:fillRef idx="1">
+            <a:schemeClr val="accent1"/>
+          </a:fillRef>
+          <a:effectRef idx="0">
+            <a:schemeClr val="accent1"/>
+          </a:effectRef>
+          <a:fontRef idx="minor">
+            <a:schemeClr val="lt1"/>
+          </a:fontRef>
+        </p:style>
+        <p:txBody>
+          <a:bodyPr rtlCol="0" anchor="ctr"/>
+          <a:lstStyle/>
+          <a:p>
+            <a:pPr algn="ctr"/>
+            <a:r>
+              <a:rPr lang="es-MX" dirty="0"/>
+              <a:t>“query-1” significa “consulta 1” porque quiero consultar los datos o archivos de la rama principal</a:t>
+            </a:r>
+            <a:endParaRPr lang="en-US" dirty="0"/>
+          </a:p>
+        </p:txBody>
+      </p:sp>
+      <p:pic>
+        <p:nvPicPr>
+          <p:cNvPr id="1026" name="Picture 2" descr="Git Branches: List, Create, Switch to, Merge, Push, &amp; Delete">
+            <a:extLst>
+              <a:ext uri="{FF2B5EF4-FFF2-40B4-BE49-F238E27FC236}">
+                <a16:creationId xmlns:a16="http://schemas.microsoft.com/office/drawing/2014/main" id="{EC6FB8FE-5BBE-F7BD-5027-247D369DFB8F}"/>
+              </a:ext>
+            </a:extLst>
+          </p:cNvPr>
+          <p:cNvPicPr>
+            <a:picLocks noChangeAspect="1" noChangeArrowheads="1"/>
+          </p:cNvPicPr>
+          <p:nvPr/>
+        </p:nvPicPr>
+        <p:blipFill>
+          <a:blip r:embed="rId3">
+            <a:extLst>
+              <a:ext uri="{28A0092B-C50C-407E-A947-70E740481C1C}">
+                <a14:useLocalDpi xmlns:a14="http://schemas.microsoft.com/office/drawing/2010/main" val="0"/>
+              </a:ext>
+            </a:extLst>
+          </a:blip>
+          <a:srcRect/>
+          <a:stretch>
+            <a:fillRect/>
+          </a:stretch>
+        </p:blipFill>
+        <p:spPr bwMode="auto">
+          <a:xfrm>
+            <a:off x="6643670" y="4665057"/>
+            <a:ext cx="3921007" cy="2009111"/>
+          </a:xfrm>
+          <a:prstGeom prst="rect">
+            <a:avLst/>
+          </a:prstGeom>
+          <a:solidFill>
+            <a:srgbClr val="FFFFFF">
+              <a:shade val="85000"/>
+            </a:srgbClr>
+          </a:solidFill>
+          <a:ln w="88900" cap="sq">
+            <a:solidFill>
+              <a:srgbClr val="FFFFFF"/>
+            </a:solidFill>
+            <a:miter lim="800000"/>
+          </a:ln>
+          <a:effectLst>
+            <a:outerShdw blurRad="55000" dist="18000" dir="5400000" algn="tl" rotWithShape="0">
+              <a:srgbClr val="000000">
+                <a:alpha val="40000"/>
+              </a:srgbClr>
+            </a:outerShdw>
+          </a:effectLst>
+          <a:scene3d>
+            <a:camera prst="orthographicFront"/>
+            <a:lightRig rig="twoPt" dir="t">
+              <a:rot lat="0" lon="0" rev="7200000"/>
+            </a:lightRig>
+          </a:scene3d>
+          <a:sp3d>
+            <a:bevelT w="25400" h="19050"/>
+            <a:contourClr>
+              <a:srgbClr val="FFFFFF"/>
+            </a:contourClr>
+          </a:sp3d>
+          <a:extLst>
+            <a:ext uri="{909E8E84-426E-40DD-AFC4-6F175D3DCCD1}">
+              <a14:hiddenFill xmlns:a14="http://schemas.microsoft.com/office/drawing/2010/main">
+                <a:solidFill>
+                  <a:srgbClr val="FFFFFF"/>
+                </a:solidFill>
+              </a14:hiddenFill>
+            </a:ext>
+          </a:extLst>
+        </p:spPr>
+      </p:pic>
+      <p:sp>
+        <p:nvSpPr>
+          <p:cNvPr id="14" name="Rectangle 13">
+            <a:extLst>
+              <a:ext uri="{FF2B5EF4-FFF2-40B4-BE49-F238E27FC236}">
+                <a16:creationId xmlns:a16="http://schemas.microsoft.com/office/drawing/2014/main" id="{B3E33FFC-8A1A-4416-1698-7EF85F900F6E}"/>
+              </a:ext>
+            </a:extLst>
+          </p:cNvPr>
+          <p:cNvSpPr/>
+          <p:nvPr/>
+        </p:nvSpPr>
+        <p:spPr>
+          <a:xfrm>
+            <a:off x="417509" y="4149970"/>
+            <a:ext cx="3621069" cy="1644182"/>
+          </a:xfrm>
+          <a:prstGeom prst="rect">
+            <a:avLst/>
+          </a:prstGeom>
+        </p:spPr>
+        <p:style>
+          <a:lnRef idx="2">
+            <a:schemeClr val="accent1">
+              <a:shade val="15000"/>
+            </a:schemeClr>
+          </a:lnRef>
+          <a:fillRef idx="1">
+            <a:schemeClr val="accent1"/>
+          </a:fillRef>
+          <a:effectRef idx="0">
+            <a:schemeClr val="accent1"/>
+          </a:effectRef>
+          <a:fontRef idx="minor">
+            <a:schemeClr val="lt1"/>
+          </a:fontRef>
+        </p:style>
+        <p:txBody>
+          <a:bodyPr rtlCol="0" anchor="ctr"/>
+          <a:lstStyle/>
+          <a:p>
+            <a:pPr algn="ctr"/>
+            <a:r>
+              <a:rPr lang="es-MX" dirty="0"/>
+              <a:t>Una vez dada la consulta, hay que poner atención que vas a juntar con que, ESCOGER rama para JUNTAR con query-1, usualmente se edita en ramas y se junta a “</a:t>
+            </a:r>
+            <a:r>
+              <a:rPr lang="es-MX" dirty="0" err="1"/>
+              <a:t>main</a:t>
+            </a:r>
+            <a:r>
+              <a:rPr lang="es-MX" dirty="0"/>
+              <a:t>”</a:t>
+            </a:r>
+            <a:endParaRPr lang="en-US" dirty="0"/>
+          </a:p>
+        </p:txBody>
+      </p:sp>
+      <p:sp>
+        <p:nvSpPr>
+          <p:cNvPr id="15" name="Rectangle 14">
+            <a:extLst>
+              <a:ext uri="{FF2B5EF4-FFF2-40B4-BE49-F238E27FC236}">
+                <a16:creationId xmlns:a16="http://schemas.microsoft.com/office/drawing/2014/main" id="{BBB87AE4-950D-CCCB-43D7-35320CA8DB4E}"/>
+              </a:ext>
+            </a:extLst>
+          </p:cNvPr>
+          <p:cNvSpPr/>
+          <p:nvPr/>
+        </p:nvSpPr>
+        <p:spPr>
+          <a:xfrm>
+            <a:off x="9282537" y="2501390"/>
+            <a:ext cx="2705292" cy="1514949"/>
+          </a:xfrm>
+          <a:prstGeom prst="rect">
+            <a:avLst/>
+          </a:prstGeom>
+          <a:solidFill>
+            <a:schemeClr val="accent1">
+              <a:lumMod val="60000"/>
+              <a:lumOff val="40000"/>
+            </a:schemeClr>
+          </a:solidFill>
+          <a:ln>
+            <a:solidFill>
+              <a:schemeClr val="tx1"/>
+            </a:solidFill>
+          </a:ln>
+        </p:spPr>
+        <p:style>
+          <a:lnRef idx="2">
+            <a:schemeClr val="accent1">
+              <a:shade val="15000"/>
+            </a:schemeClr>
+          </a:lnRef>
+          <a:fillRef idx="1">
+            <a:schemeClr val="accent1"/>
+          </a:fillRef>
+          <a:effectRef idx="0">
+            <a:schemeClr val="accent1"/>
+          </a:effectRef>
+          <a:fontRef idx="minor">
+            <a:schemeClr val="lt1"/>
+          </a:fontRef>
+        </p:style>
+        <p:txBody>
+          <a:bodyPr rtlCol="0" anchor="ctr"/>
+          <a:lstStyle/>
+          <a:p>
+            <a:pPr algn="ctr"/>
+            <a:r>
+              <a:rPr lang="es-MX" dirty="0"/>
+              <a:t>Esta mecánica de trabajo es similar al PLM “</a:t>
+            </a:r>
+            <a:r>
+              <a:rPr lang="es-MX" dirty="0" err="1"/>
+              <a:t>Product</a:t>
+            </a:r>
+            <a:r>
+              <a:rPr lang="es-MX" dirty="0"/>
+              <a:t> </a:t>
+            </a:r>
+            <a:r>
+              <a:rPr lang="es-MX" dirty="0" err="1"/>
+              <a:t>Lifecycle</a:t>
+            </a:r>
+            <a:r>
+              <a:rPr lang="es-MX" dirty="0"/>
+              <a:t> </a:t>
+            </a:r>
+            <a:r>
+              <a:rPr lang="es-MX" dirty="0" err="1"/>
+              <a:t>Managment</a:t>
+            </a:r>
+            <a:r>
+              <a:rPr lang="es-MX" dirty="0"/>
+              <a:t>” muy usado en empresas</a:t>
+            </a:r>
+            <a:endParaRPr lang="en-US" dirty="0"/>
+          </a:p>
+        </p:txBody>
+      </p:sp>
+    </p:spTree>
+    <p:extLst>
+      <p:ext uri="{BB962C8B-B14F-4D97-AF65-F5344CB8AC3E}">
+        <p14:creationId xmlns:p14="http://schemas.microsoft.com/office/powerpoint/2010/main" val="1263294039"/>
+      </p:ext>
+    </p:extLst>
+  </p:cSld>
+  <p:clrMapOvr>
+    <a:masterClrMapping/>
+  </p:clrMapOvr>
+</p:sld>
+</file>
+
 <file path=ppt/theme/theme1.xml><?xml version="1.0" encoding="utf-8"?>
 <a:theme xmlns:a="http://schemas.openxmlformats.org/drawingml/2006/main" name="Office Theme">
   <a:themeElements>
@@ -7329,23 +8105,6 @@
 </file>
 
 <file path=customXml/item1.xml><?xml version="1.0" encoding="utf-8"?>
-<p:properties xmlns:p="http://schemas.microsoft.com/office/2006/metadata/properties" xmlns:xsi="http://www.w3.org/2001/XMLSchema-instance" xmlns:pc="http://schemas.microsoft.com/office/infopath/2007/PartnerControls">
-  <documentManagement>
-    <_activity xmlns="0d9ec5f8-2dd8-4e62-9596-3147450cd266" xsi:nil="true"/>
-  </documentManagement>
-</p:properties>
-</file>
-
-<file path=customXml/item2.xml><?xml version="1.0" encoding="utf-8"?>
-<?mso-contentType ?>
-<FormTemplates xmlns="http://schemas.microsoft.com/sharepoint/v3/contenttype/forms">
-  <Display>DocumentLibraryForm</Display>
-  <Edit>DocumentLibraryForm</Edit>
-  <New>DocumentLibraryForm</New>
-</FormTemplates>
-</file>
-
-<file path=customXml/item3.xml><?xml version="1.0" encoding="utf-8"?>
 <ct:contentTypeSchema xmlns:ct="http://schemas.microsoft.com/office/2006/metadata/contentType" xmlns:ma="http://schemas.microsoft.com/office/2006/metadata/properties/metaAttributes" ct:_="" ma:_="" ma:contentTypeName="Document" ma:contentTypeID="0x010100048DB3F73D29FD439D45DB49E8F22F6F" ma:contentTypeVersion="17" ma:contentTypeDescription="Create a new document." ma:contentTypeScope="" ma:versionID="df8ea05f5e14a647312c69191883f445">
   <xsd:schema xmlns:xsd="http://www.w3.org/2001/XMLSchema" xmlns:xs="http://www.w3.org/2001/XMLSchema" xmlns:p="http://schemas.microsoft.com/office/2006/metadata/properties" xmlns:ns3="0d9ec5f8-2dd8-4e62-9596-3147450cd266" xmlns:ns4="f48ec59d-1461-4a76-a4f4-14b8a05189bb" targetNamespace="http://schemas.microsoft.com/office/2006/metadata/properties" ma:root="true" ma:fieldsID="f532eb55b6dff7be5c9ba953563b137a" ns3:_="" ns4:_="">
     <xsd:import namespace="0d9ec5f8-2dd8-4e62-9596-3147450cd266"/>
@@ -7592,32 +8351,24 @@
 </ct:contentTypeSchema>
 </file>
 
-<file path=customXml/itemProps1.xml><?xml version="1.0" encoding="utf-8"?>
-<ds:datastoreItem xmlns:ds="http://schemas.openxmlformats.org/officeDocument/2006/customXml" ds:itemID="{EF78CD88-E45C-452C-B644-0D3ABEE3634E}">
-  <ds:schemaRefs>
-    <ds:schemaRef ds:uri="http://purl.org/dc/elements/1.1/"/>
-    <ds:schemaRef ds:uri="http://schemas.microsoft.com/office/2006/documentManagement/types"/>
-    <ds:schemaRef ds:uri="http://purl.org/dc/dcmitype/"/>
-    <ds:schemaRef ds:uri="http://www.w3.org/XML/1998/namespace"/>
-    <ds:schemaRef ds:uri="http://purl.org/dc/terms/"/>
-    <ds:schemaRef ds:uri="http://schemas.microsoft.com/office/infopath/2007/PartnerControls"/>
-    <ds:schemaRef ds:uri="f48ec59d-1461-4a76-a4f4-14b8a05189bb"/>
-    <ds:schemaRef ds:uri="http://schemas.openxmlformats.org/package/2006/metadata/core-properties"/>
-    <ds:schemaRef ds:uri="0d9ec5f8-2dd8-4e62-9596-3147450cd266"/>
-    <ds:schemaRef ds:uri="http://schemas.microsoft.com/office/2006/metadata/properties"/>
-  </ds:schemaRefs>
-</ds:datastoreItem>
+<file path=customXml/item2.xml><?xml version="1.0" encoding="utf-8"?>
+<?mso-contentType ?>
+<FormTemplates xmlns="http://schemas.microsoft.com/sharepoint/v3/contenttype/forms">
+  <Display>DocumentLibraryForm</Display>
+  <Edit>DocumentLibraryForm</Edit>
+  <New>DocumentLibraryForm</New>
+</FormTemplates>
 </file>
 
-<file path=customXml/itemProps2.xml><?xml version="1.0" encoding="utf-8"?>
-<ds:datastoreItem xmlns:ds="http://schemas.openxmlformats.org/officeDocument/2006/customXml" ds:itemID="{6D5B1230-56AF-4247-8C83-47A044BBF626}">
-  <ds:schemaRefs>
-    <ds:schemaRef ds:uri="http://schemas.microsoft.com/sharepoint/v3/contenttype/forms"/>
-  </ds:schemaRefs>
-</ds:datastoreItem>
+<file path=customXml/item3.xml><?xml version="1.0" encoding="utf-8"?>
+<p:properties xmlns:p="http://schemas.microsoft.com/office/2006/metadata/properties" xmlns:xsi="http://www.w3.org/2001/XMLSchema-instance" xmlns:pc="http://schemas.microsoft.com/office/infopath/2007/PartnerControls">
+  <documentManagement>
+    <_activity xmlns="0d9ec5f8-2dd8-4e62-9596-3147450cd266" xsi:nil="true"/>
+  </documentManagement>
+</p:properties>
 </file>
 
-<file path=customXml/itemProps3.xml><?xml version="1.0" encoding="utf-8"?>
+<file path=customXml/itemProps1.xml><?xml version="1.0" encoding="utf-8"?>
 <ds:datastoreItem xmlns:ds="http://schemas.openxmlformats.org/officeDocument/2006/customXml" ds:itemID="{F82F45FB-365A-43B6-8A21-3420EF467609}">
   <ds:schemaRefs>
     <ds:schemaRef ds:uri="http://schemas.microsoft.com/office/2006/metadata/contentType"/>
@@ -7634,4 +8385,29 @@
     <ds:schemaRef ds:uri="http://schemas.microsoft.com/internal/obd"/>
   </ds:schemaRefs>
 </ds:datastoreItem>
+</file>
+
+<file path=customXml/itemProps2.xml><?xml version="1.0" encoding="utf-8"?>
+<ds:datastoreItem xmlns:ds="http://schemas.openxmlformats.org/officeDocument/2006/customXml" ds:itemID="{6D5B1230-56AF-4247-8C83-47A044BBF626}">
+  <ds:schemaRefs>
+    <ds:schemaRef ds:uri="http://schemas.microsoft.com/sharepoint/v3/contenttype/forms"/>
+  </ds:schemaRefs>
+</ds:datastoreItem>
+</file>
+
+<file path=customXml/itemProps3.xml><?xml version="1.0" encoding="utf-8"?>
+<ds:datastoreItem xmlns:ds="http://schemas.openxmlformats.org/officeDocument/2006/customXml" ds:itemID="{EF78CD88-E45C-452C-B644-0D3ABEE3634E}">
+  <ds:schemaRefs>
+    <ds:schemaRef ds:uri="http://purl.org/dc/elements/1.1/"/>
+    <ds:schemaRef ds:uri="http://schemas.microsoft.com/office/2006/documentManagement/types"/>
+    <ds:schemaRef ds:uri="http://purl.org/dc/dcmitype/"/>
+    <ds:schemaRef ds:uri="http://www.w3.org/XML/1998/namespace"/>
+    <ds:schemaRef ds:uri="http://purl.org/dc/terms/"/>
+    <ds:schemaRef ds:uri="http://schemas.microsoft.com/office/infopath/2007/PartnerControls"/>
+    <ds:schemaRef ds:uri="f48ec59d-1461-4a76-a4f4-14b8a05189bb"/>
+    <ds:schemaRef ds:uri="http://schemas.openxmlformats.org/package/2006/metadata/core-properties"/>
+    <ds:schemaRef ds:uri="0d9ec5f8-2dd8-4e62-9596-3147450cd266"/>
+    <ds:schemaRef ds:uri="http://schemas.microsoft.com/office/2006/metadata/properties"/>
+  </ds:schemaRefs>
+</ds:datastoreItem>
 </file>
</xml_diff>

<commit_message>
Add CFD forebody CAD file and update tutorial
Added the CFDforebodySW.SLDPRT CAD file for CFD simulations and updated the tutorial presentation to reflect recent changes.
</commit_message>
<xml_diff>
--- a/Tutorial github y cfd.pptx
+++ b/Tutorial github y cfd.pptx
@@ -4,6 +4,9 @@
   <p:sldMasterIdLst>
     <p:sldMasterId id="2147483648" r:id="rId4"/>
   </p:sldMasterIdLst>
+  <p:notesMasterIdLst>
+    <p:notesMasterId r:id="rId9"/>
+  </p:notesMasterIdLst>
   <p:sldIdLst>
     <p:sldId id="257" r:id="rId5"/>
     <p:sldId id="258" r:id="rId6"/>
@@ -2683,6 +2686,439 @@
 </dgm:styleDef>
 </file>
 
+<file path=ppt/notesMasters/notesMaster1.xml><?xml version="1.0" encoding="utf-8"?>
+<p:notesMaster xmlns:a="http://schemas.openxmlformats.org/drawingml/2006/main" xmlns:r="http://schemas.openxmlformats.org/officeDocument/2006/relationships" xmlns:p="http://schemas.openxmlformats.org/presentationml/2006/main">
+  <p:cSld>
+    <p:bg>
+      <p:bgRef idx="1001">
+        <a:schemeClr val="bg1"/>
+      </p:bgRef>
+    </p:bg>
+    <p:spTree>
+      <p:nvGrpSpPr>
+        <p:cNvPr id="1" name=""/>
+        <p:cNvGrpSpPr/>
+        <p:nvPr/>
+      </p:nvGrpSpPr>
+      <p:grpSpPr>
+        <a:xfrm>
+          <a:off x="0" y="0"/>
+          <a:ext cx="0" cy="0"/>
+          <a:chOff x="0" y="0"/>
+          <a:chExt cx="0" cy="0"/>
+        </a:xfrm>
+      </p:grpSpPr>
+      <p:sp>
+        <p:nvSpPr>
+          <p:cNvPr id="2" name="Header Placeholder 1"/>
+          <p:cNvSpPr>
+            <a:spLocks noGrp="1"/>
+          </p:cNvSpPr>
+          <p:nvPr>
+            <p:ph type="hdr" sz="quarter"/>
+          </p:nvPr>
+        </p:nvSpPr>
+        <p:spPr>
+          <a:xfrm>
+            <a:off x="0" y="0"/>
+            <a:ext cx="2971800" cy="458788"/>
+          </a:xfrm>
+          <a:prstGeom prst="rect">
+            <a:avLst/>
+          </a:prstGeom>
+        </p:spPr>
+        <p:txBody>
+          <a:bodyPr vert="horz" lIns="91440" tIns="45720" rIns="91440" bIns="45720" rtlCol="0"/>
+          <a:lstStyle>
+            <a:lvl1pPr algn="l">
+              <a:defRPr sz="1200"/>
+            </a:lvl1pPr>
+          </a:lstStyle>
+          <a:p>
+            <a:endParaRPr lang="en-US"/>
+          </a:p>
+        </p:txBody>
+      </p:sp>
+      <p:sp>
+        <p:nvSpPr>
+          <p:cNvPr id="3" name="Date Placeholder 2"/>
+          <p:cNvSpPr>
+            <a:spLocks noGrp="1"/>
+          </p:cNvSpPr>
+          <p:nvPr>
+            <p:ph type="dt" idx="1"/>
+          </p:nvPr>
+        </p:nvSpPr>
+        <p:spPr>
+          <a:xfrm>
+            <a:off x="3884613" y="0"/>
+            <a:ext cx="2971800" cy="458788"/>
+          </a:xfrm>
+          <a:prstGeom prst="rect">
+            <a:avLst/>
+          </a:prstGeom>
+        </p:spPr>
+        <p:txBody>
+          <a:bodyPr vert="horz" lIns="91440" tIns="45720" rIns="91440" bIns="45720" rtlCol="0"/>
+          <a:lstStyle>
+            <a:lvl1pPr algn="r">
+              <a:defRPr sz="1200"/>
+            </a:lvl1pPr>
+          </a:lstStyle>
+          <a:p>
+            <a:fld id="{D9C9F514-B643-415D-ACB9-8E9DD0733AF1}" type="datetimeFigureOut">
+              <a:rPr lang="en-US" smtClean="0"/>
+              <a:t>7/22/2025</a:t>
+            </a:fld>
+            <a:endParaRPr lang="en-US"/>
+          </a:p>
+        </p:txBody>
+      </p:sp>
+      <p:sp>
+        <p:nvSpPr>
+          <p:cNvPr id="4" name="Slide Image Placeholder 3"/>
+          <p:cNvSpPr>
+            <a:spLocks noGrp="1" noRot="1" noChangeAspect="1"/>
+          </p:cNvSpPr>
+          <p:nvPr>
+            <p:ph type="sldImg" idx="2"/>
+          </p:nvPr>
+        </p:nvSpPr>
+        <p:spPr>
+          <a:xfrm>
+            <a:off x="685800" y="1143000"/>
+            <a:ext cx="5486400" cy="3086100"/>
+          </a:xfrm>
+          <a:prstGeom prst="rect">
+            <a:avLst/>
+          </a:prstGeom>
+          <a:noFill/>
+          <a:ln w="12700">
+            <a:solidFill>
+              <a:prstClr val="black"/>
+            </a:solidFill>
+          </a:ln>
+        </p:spPr>
+        <p:txBody>
+          <a:bodyPr vert="horz" lIns="91440" tIns="45720" rIns="91440" bIns="45720" rtlCol="0" anchor="ctr"/>
+          <a:lstStyle/>
+          <a:p>
+            <a:endParaRPr lang="en-US"/>
+          </a:p>
+        </p:txBody>
+      </p:sp>
+      <p:sp>
+        <p:nvSpPr>
+          <p:cNvPr id="5" name="Notes Placeholder 4"/>
+          <p:cNvSpPr>
+            <a:spLocks noGrp="1"/>
+          </p:cNvSpPr>
+          <p:nvPr>
+            <p:ph type="body" sz="quarter" idx="3"/>
+          </p:nvPr>
+        </p:nvSpPr>
+        <p:spPr>
+          <a:xfrm>
+            <a:off x="685800" y="4400550"/>
+            <a:ext cx="5486400" cy="3600450"/>
+          </a:xfrm>
+          <a:prstGeom prst="rect">
+            <a:avLst/>
+          </a:prstGeom>
+        </p:spPr>
+        <p:txBody>
+          <a:bodyPr vert="horz" lIns="91440" tIns="45720" rIns="91440" bIns="45720" rtlCol="0"/>
+          <a:lstStyle/>
+          <a:p>
+            <a:pPr lvl="0"/>
+            <a:r>
+              <a:rPr lang="en-US"/>
+              <a:t>Click to edit Master text styles</a:t>
+            </a:r>
+          </a:p>
+          <a:p>
+            <a:pPr lvl="1"/>
+            <a:r>
+              <a:rPr lang="en-US"/>
+              <a:t>Second level</a:t>
+            </a:r>
+          </a:p>
+          <a:p>
+            <a:pPr lvl="2"/>
+            <a:r>
+              <a:rPr lang="en-US"/>
+              <a:t>Third level</a:t>
+            </a:r>
+          </a:p>
+          <a:p>
+            <a:pPr lvl="3"/>
+            <a:r>
+              <a:rPr lang="en-US"/>
+              <a:t>Fourth level</a:t>
+            </a:r>
+          </a:p>
+          <a:p>
+            <a:pPr lvl="4"/>
+            <a:r>
+              <a:rPr lang="en-US"/>
+              <a:t>Fifth level</a:t>
+            </a:r>
+          </a:p>
+        </p:txBody>
+      </p:sp>
+      <p:sp>
+        <p:nvSpPr>
+          <p:cNvPr id="6" name="Footer Placeholder 5"/>
+          <p:cNvSpPr>
+            <a:spLocks noGrp="1"/>
+          </p:cNvSpPr>
+          <p:nvPr>
+            <p:ph type="ftr" sz="quarter" idx="4"/>
+          </p:nvPr>
+        </p:nvSpPr>
+        <p:spPr>
+          <a:xfrm>
+            <a:off x="0" y="8685213"/>
+            <a:ext cx="2971800" cy="458787"/>
+          </a:xfrm>
+          <a:prstGeom prst="rect">
+            <a:avLst/>
+          </a:prstGeom>
+        </p:spPr>
+        <p:txBody>
+          <a:bodyPr vert="horz" lIns="91440" tIns="45720" rIns="91440" bIns="45720" rtlCol="0" anchor="b"/>
+          <a:lstStyle>
+            <a:lvl1pPr algn="l">
+              <a:defRPr sz="1200"/>
+            </a:lvl1pPr>
+          </a:lstStyle>
+          <a:p>
+            <a:endParaRPr lang="en-US"/>
+          </a:p>
+        </p:txBody>
+      </p:sp>
+      <p:sp>
+        <p:nvSpPr>
+          <p:cNvPr id="7" name="Slide Number Placeholder 6"/>
+          <p:cNvSpPr>
+            <a:spLocks noGrp="1"/>
+          </p:cNvSpPr>
+          <p:nvPr>
+            <p:ph type="sldNum" sz="quarter" idx="5"/>
+          </p:nvPr>
+        </p:nvSpPr>
+        <p:spPr>
+          <a:xfrm>
+            <a:off x="3884613" y="8685213"/>
+            <a:ext cx="2971800" cy="458787"/>
+          </a:xfrm>
+          <a:prstGeom prst="rect">
+            <a:avLst/>
+          </a:prstGeom>
+        </p:spPr>
+        <p:txBody>
+          <a:bodyPr vert="horz" lIns="91440" tIns="45720" rIns="91440" bIns="45720" rtlCol="0" anchor="b"/>
+          <a:lstStyle>
+            <a:lvl1pPr algn="r">
+              <a:defRPr sz="1200"/>
+            </a:lvl1pPr>
+          </a:lstStyle>
+          <a:p>
+            <a:fld id="{18D7AC3A-5297-4B6C-9688-3B24DAA30A4F}" type="slidenum">
+              <a:rPr lang="en-US" smtClean="0"/>
+              <a:t>‹#›</a:t>
+            </a:fld>
+            <a:endParaRPr lang="en-US"/>
+          </a:p>
+        </p:txBody>
+      </p:sp>
+    </p:spTree>
+    <p:extLst>
+      <p:ext uri="{BB962C8B-B14F-4D97-AF65-F5344CB8AC3E}">
+        <p14:creationId xmlns:p14="http://schemas.microsoft.com/office/powerpoint/2010/main" val="3483016570"/>
+      </p:ext>
+    </p:extLst>
+  </p:cSld>
+  <p:clrMap bg1="lt1" tx1="dk1" bg2="lt2" tx2="dk2" accent1="accent1" accent2="accent2" accent3="accent3" accent4="accent4" accent5="accent5" accent6="accent6" hlink="hlink" folHlink="folHlink"/>
+  <p:notesStyle>
+    <a:lvl1pPr marL="0" algn="l" defTabSz="914400" rtl="0" eaLnBrk="1" latinLnBrk="0" hangingPunct="1">
+      <a:defRPr sz="1200" kern="1200">
+        <a:solidFill>
+          <a:schemeClr val="tx1"/>
+        </a:solidFill>
+        <a:latin typeface="+mn-lt"/>
+        <a:ea typeface="+mn-ea"/>
+        <a:cs typeface="+mn-cs"/>
+      </a:defRPr>
+    </a:lvl1pPr>
+    <a:lvl2pPr marL="457200" algn="l" defTabSz="914400" rtl="0" eaLnBrk="1" latinLnBrk="0" hangingPunct="1">
+      <a:defRPr sz="1200" kern="1200">
+        <a:solidFill>
+          <a:schemeClr val="tx1"/>
+        </a:solidFill>
+        <a:latin typeface="+mn-lt"/>
+        <a:ea typeface="+mn-ea"/>
+        <a:cs typeface="+mn-cs"/>
+      </a:defRPr>
+    </a:lvl2pPr>
+    <a:lvl3pPr marL="914400" algn="l" defTabSz="914400" rtl="0" eaLnBrk="1" latinLnBrk="0" hangingPunct="1">
+      <a:defRPr sz="1200" kern="1200">
+        <a:solidFill>
+          <a:schemeClr val="tx1"/>
+        </a:solidFill>
+        <a:latin typeface="+mn-lt"/>
+        <a:ea typeface="+mn-ea"/>
+        <a:cs typeface="+mn-cs"/>
+      </a:defRPr>
+    </a:lvl3pPr>
+    <a:lvl4pPr marL="1371600" algn="l" defTabSz="914400" rtl="0" eaLnBrk="1" latinLnBrk="0" hangingPunct="1">
+      <a:defRPr sz="1200" kern="1200">
+        <a:solidFill>
+          <a:schemeClr val="tx1"/>
+        </a:solidFill>
+        <a:latin typeface="+mn-lt"/>
+        <a:ea typeface="+mn-ea"/>
+        <a:cs typeface="+mn-cs"/>
+      </a:defRPr>
+    </a:lvl4pPr>
+    <a:lvl5pPr marL="1828800" algn="l" defTabSz="914400" rtl="0" eaLnBrk="1" latinLnBrk="0" hangingPunct="1">
+      <a:defRPr sz="1200" kern="1200">
+        <a:solidFill>
+          <a:schemeClr val="tx1"/>
+        </a:solidFill>
+        <a:latin typeface="+mn-lt"/>
+        <a:ea typeface="+mn-ea"/>
+        <a:cs typeface="+mn-cs"/>
+      </a:defRPr>
+    </a:lvl5pPr>
+    <a:lvl6pPr marL="2286000" algn="l" defTabSz="914400" rtl="0" eaLnBrk="1" latinLnBrk="0" hangingPunct="1">
+      <a:defRPr sz="1200" kern="1200">
+        <a:solidFill>
+          <a:schemeClr val="tx1"/>
+        </a:solidFill>
+        <a:latin typeface="+mn-lt"/>
+        <a:ea typeface="+mn-ea"/>
+        <a:cs typeface="+mn-cs"/>
+      </a:defRPr>
+    </a:lvl6pPr>
+    <a:lvl7pPr marL="2743200" algn="l" defTabSz="914400" rtl="0" eaLnBrk="1" latinLnBrk="0" hangingPunct="1">
+      <a:defRPr sz="1200" kern="1200">
+        <a:solidFill>
+          <a:schemeClr val="tx1"/>
+        </a:solidFill>
+        <a:latin typeface="+mn-lt"/>
+        <a:ea typeface="+mn-ea"/>
+        <a:cs typeface="+mn-cs"/>
+      </a:defRPr>
+    </a:lvl7pPr>
+    <a:lvl8pPr marL="3200400" algn="l" defTabSz="914400" rtl="0" eaLnBrk="1" latinLnBrk="0" hangingPunct="1">
+      <a:defRPr sz="1200" kern="1200">
+        <a:solidFill>
+          <a:schemeClr val="tx1"/>
+        </a:solidFill>
+        <a:latin typeface="+mn-lt"/>
+        <a:ea typeface="+mn-ea"/>
+        <a:cs typeface="+mn-cs"/>
+      </a:defRPr>
+    </a:lvl8pPr>
+    <a:lvl9pPr marL="3657600" algn="l" defTabSz="914400" rtl="0" eaLnBrk="1" latinLnBrk="0" hangingPunct="1">
+      <a:defRPr sz="1200" kern="1200">
+        <a:solidFill>
+          <a:schemeClr val="tx1"/>
+        </a:solidFill>
+        <a:latin typeface="+mn-lt"/>
+        <a:ea typeface="+mn-ea"/>
+        <a:cs typeface="+mn-cs"/>
+      </a:defRPr>
+    </a:lvl9pPr>
+  </p:notesStyle>
+</p:notesMaster>
+</file>
+
+<file path=ppt/notesSlides/notesSlide1.xml><?xml version="1.0" encoding="utf-8"?>
+<p:notes xmlns:a="http://schemas.openxmlformats.org/drawingml/2006/main" xmlns:r="http://schemas.openxmlformats.org/officeDocument/2006/relationships" xmlns:p="http://schemas.openxmlformats.org/presentationml/2006/main">
+  <p:cSld>
+    <p:spTree>
+      <p:nvGrpSpPr>
+        <p:cNvPr id="1" name=""/>
+        <p:cNvGrpSpPr/>
+        <p:nvPr/>
+      </p:nvGrpSpPr>
+      <p:grpSpPr>
+        <a:xfrm>
+          <a:off x="0" y="0"/>
+          <a:ext cx="0" cy="0"/>
+          <a:chOff x="0" y="0"/>
+          <a:chExt cx="0" cy="0"/>
+        </a:xfrm>
+      </p:grpSpPr>
+      <p:sp>
+        <p:nvSpPr>
+          <p:cNvPr id="2" name="Slide Image Placeholder 1"/>
+          <p:cNvSpPr>
+            <a:spLocks noGrp="1" noRot="1" noChangeAspect="1"/>
+          </p:cNvSpPr>
+          <p:nvPr>
+            <p:ph type="sldImg"/>
+          </p:nvPr>
+        </p:nvSpPr>
+        <p:spPr/>
+      </p:sp>
+      <p:sp>
+        <p:nvSpPr>
+          <p:cNvPr id="3" name="Notes Placeholder 2"/>
+          <p:cNvSpPr>
+            <a:spLocks noGrp="1"/>
+          </p:cNvSpPr>
+          <p:nvPr>
+            <p:ph type="body" idx="1"/>
+          </p:nvPr>
+        </p:nvSpPr>
+        <p:spPr/>
+        <p:txBody>
+          <a:bodyPr/>
+          <a:lstStyle/>
+          <a:p>
+            <a:endParaRPr lang="en-US" dirty="0"/>
+          </a:p>
+        </p:txBody>
+      </p:sp>
+      <p:sp>
+        <p:nvSpPr>
+          <p:cNvPr id="4" name="Slide Number Placeholder 3"/>
+          <p:cNvSpPr>
+            <a:spLocks noGrp="1"/>
+          </p:cNvSpPr>
+          <p:nvPr>
+            <p:ph type="sldNum" sz="quarter" idx="5"/>
+          </p:nvPr>
+        </p:nvSpPr>
+        <p:spPr/>
+        <p:txBody>
+          <a:bodyPr/>
+          <a:lstStyle/>
+          <a:p>
+            <a:fld id="{18D7AC3A-5297-4B6C-9688-3B24DAA30A4F}" type="slidenum">
+              <a:rPr lang="en-US" smtClean="0"/>
+              <a:t>1</a:t>
+            </a:fld>
+            <a:endParaRPr lang="en-US"/>
+          </a:p>
+        </p:txBody>
+      </p:sp>
+    </p:spTree>
+    <p:extLst>
+      <p:ext uri="{BB962C8B-B14F-4D97-AF65-F5344CB8AC3E}">
+        <p14:creationId xmlns:p14="http://schemas.microsoft.com/office/powerpoint/2010/main" val="2841979494"/>
+      </p:ext>
+    </p:extLst>
+  </p:cSld>
+  <p:clrMapOvr>
+    <a:masterClrMapping/>
+  </p:clrMapOvr>
+</p:notes>
+</file>
+
 <file path=ppt/slideLayouts/slideLayout1.xml><?xml version="1.0" encoding="utf-8"?>
 <p:sldLayout xmlns:a="http://schemas.openxmlformats.org/drawingml/2006/main" xmlns:r="http://schemas.openxmlformats.org/officeDocument/2006/relationships" xmlns:p="http://schemas.openxmlformats.org/presentationml/2006/main" type="title" preserve="1">
   <p:cSld name="Title Slide">
@@ -6122,7 +6558,7 @@
           <p:nvPr/>
         </p:nvPicPr>
         <p:blipFill>
-          <a:blip r:embed="rId2">
+          <a:blip r:embed="rId3">
             <a:extLst>
               <a:ext uri="{28A0092B-C50C-407E-A947-70E740481C1C}">
                 <a14:useLocalDpi xmlns:a14="http://schemas.microsoft.com/office/drawing/2010/main" val="0"/>
@@ -7622,15 +8058,6 @@
               <a:srgbClr val="FFFFFF"/>
             </a:contourClr>
           </a:sp3d>
-          <a:extLst>
-            <a:ext uri="{909E8E84-426E-40DD-AFC4-6F175D3DCCD1}">
-              <a14:hiddenFill xmlns:a14="http://schemas.microsoft.com/office/drawing/2010/main">
-                <a:solidFill>
-                  <a:srgbClr val="FFFFFF"/>
-                </a:solidFill>
-              </a14:hiddenFill>
-            </a:ext>
-          </a:extLst>
         </p:spPr>
       </p:pic>
       <p:sp>
@@ -7705,7 +8132,7 @@
         </p:nvSpPr>
         <p:spPr>
           <a:xfrm>
-            <a:off x="9282537" y="2501390"/>
+            <a:off x="9212031" y="1713230"/>
             <a:ext cx="2705292" cy="1514949"/>
           </a:xfrm>
           <a:prstGeom prst="rect">
@@ -8104,7 +8531,339 @@
 </a:theme>
 </file>
 
+<file path=ppt/theme/theme2.xml><?xml version="1.0" encoding="utf-8"?>
+<a:theme xmlns:a="http://schemas.openxmlformats.org/drawingml/2006/main" name="Office Theme">
+  <a:themeElements>
+    <a:clrScheme name="Office">
+      <a:dk1>
+        <a:sysClr val="windowText" lastClr="000000"/>
+      </a:dk1>
+      <a:lt1>
+        <a:sysClr val="window" lastClr="FFFFFF"/>
+      </a:lt1>
+      <a:dk2>
+        <a:srgbClr val="0E2841"/>
+      </a:dk2>
+      <a:lt2>
+        <a:srgbClr val="E8E8E8"/>
+      </a:lt2>
+      <a:accent1>
+        <a:srgbClr val="156082"/>
+      </a:accent1>
+      <a:accent2>
+        <a:srgbClr val="E97132"/>
+      </a:accent2>
+      <a:accent3>
+        <a:srgbClr val="196B24"/>
+      </a:accent3>
+      <a:accent4>
+        <a:srgbClr val="0F9ED5"/>
+      </a:accent4>
+      <a:accent5>
+        <a:srgbClr val="A02B93"/>
+      </a:accent5>
+      <a:accent6>
+        <a:srgbClr val="4EA72E"/>
+      </a:accent6>
+      <a:hlink>
+        <a:srgbClr val="467886"/>
+      </a:hlink>
+      <a:folHlink>
+        <a:srgbClr val="96607D"/>
+      </a:folHlink>
+    </a:clrScheme>
+    <a:fontScheme name="Office">
+      <a:majorFont>
+        <a:latin typeface="Aptos Display" panose="02110004020202020204"/>
+        <a:ea typeface=""/>
+        <a:cs typeface=""/>
+        <a:font script="Jpan" typeface="游ゴシック Light"/>
+        <a:font script="Hang" typeface="맑은 고딕"/>
+        <a:font script="Hans" typeface="等线 Light"/>
+        <a:font script="Hant" typeface="新細明體"/>
+        <a:font script="Arab" typeface="Times New Roman"/>
+        <a:font script="Hebr" typeface="Times New Roman"/>
+        <a:font script="Thai" typeface="Angsana New"/>
+        <a:font script="Ethi" typeface="Nyala"/>
+        <a:font script="Beng" typeface="Vrinda"/>
+        <a:font script="Gujr" typeface="Shruti"/>
+        <a:font script="Khmr" typeface="MoolBoran"/>
+        <a:font script="Knda" typeface="Tunga"/>
+        <a:font script="Guru" typeface="Raavi"/>
+        <a:font script="Cans" typeface="Euphemia"/>
+        <a:font script="Cher" typeface="Plantagenet Cherokee"/>
+        <a:font script="Yiii" typeface="Microsoft Yi Baiti"/>
+        <a:font script="Tibt" typeface="Microsoft Himalaya"/>
+        <a:font script="Thaa" typeface="MV Boli"/>
+        <a:font script="Deva" typeface="Mangal"/>
+        <a:font script="Telu" typeface="Gautami"/>
+        <a:font script="Taml" typeface="Latha"/>
+        <a:font script="Syrc" typeface="Estrangelo Edessa"/>
+        <a:font script="Orya" typeface="Kalinga"/>
+        <a:font script="Mlym" typeface="Kartika"/>
+        <a:font script="Laoo" typeface="DokChampa"/>
+        <a:font script="Sinh" typeface="Iskoola Pota"/>
+        <a:font script="Mong" typeface="Mongolian Baiti"/>
+        <a:font script="Viet" typeface="Times New Roman"/>
+        <a:font script="Uigh" typeface="Microsoft Uighur"/>
+        <a:font script="Geor" typeface="Sylfaen"/>
+        <a:font script="Armn" typeface="Arial"/>
+        <a:font script="Bugi" typeface="Leelawadee UI"/>
+        <a:font script="Bopo" typeface="Microsoft JhengHei"/>
+        <a:font script="Java" typeface="Javanese Text"/>
+        <a:font script="Lisu" typeface="Segoe UI"/>
+        <a:font script="Mymr" typeface="Myanmar Text"/>
+        <a:font script="Nkoo" typeface="Ebrima"/>
+        <a:font script="Olck" typeface="Nirmala UI"/>
+        <a:font script="Osma" typeface="Ebrima"/>
+        <a:font script="Phag" typeface="Phagspa"/>
+        <a:font script="Syrn" typeface="Estrangelo Edessa"/>
+        <a:font script="Syrj" typeface="Estrangelo Edessa"/>
+        <a:font script="Syre" typeface="Estrangelo Edessa"/>
+        <a:font script="Sora" typeface="Nirmala UI"/>
+        <a:font script="Tale" typeface="Microsoft Tai Le"/>
+        <a:font script="Talu" typeface="Microsoft New Tai Lue"/>
+        <a:font script="Tfng" typeface="Ebrima"/>
+      </a:majorFont>
+      <a:minorFont>
+        <a:latin typeface="Aptos" panose="02110004020202020204"/>
+        <a:ea typeface=""/>
+        <a:cs typeface=""/>
+        <a:font script="Jpan" typeface="游ゴシック"/>
+        <a:font script="Hang" typeface="맑은 고딕"/>
+        <a:font script="Hans" typeface="等线"/>
+        <a:font script="Hant" typeface="新細明體"/>
+        <a:font script="Arab" typeface="Arial"/>
+        <a:font script="Hebr" typeface="Arial"/>
+        <a:font script="Thai" typeface="Cordia New"/>
+        <a:font script="Ethi" typeface="Nyala"/>
+        <a:font script="Beng" typeface="Vrinda"/>
+        <a:font script="Gujr" typeface="Shruti"/>
+        <a:font script="Khmr" typeface="DaunPenh"/>
+        <a:font script="Knda" typeface="Tunga"/>
+        <a:font script="Guru" typeface="Raavi"/>
+        <a:font script="Cans" typeface="Euphemia"/>
+        <a:font script="Cher" typeface="Plantagenet Cherokee"/>
+        <a:font script="Yiii" typeface="Microsoft Yi Baiti"/>
+        <a:font script="Tibt" typeface="Microsoft Himalaya"/>
+        <a:font script="Thaa" typeface="MV Boli"/>
+        <a:font script="Deva" typeface="Mangal"/>
+        <a:font script="Telu" typeface="Gautami"/>
+        <a:font script="Taml" typeface="Latha"/>
+        <a:font script="Syrc" typeface="Estrangelo Edessa"/>
+        <a:font script="Orya" typeface="Kalinga"/>
+        <a:font script="Mlym" typeface="Kartika"/>
+        <a:font script="Laoo" typeface="DokChampa"/>
+        <a:font script="Sinh" typeface="Iskoola Pota"/>
+        <a:font script="Mong" typeface="Mongolian Baiti"/>
+        <a:font script="Viet" typeface="Arial"/>
+        <a:font script="Uigh" typeface="Microsoft Uighur"/>
+        <a:font script="Geor" typeface="Sylfaen"/>
+        <a:font script="Armn" typeface="Arial"/>
+        <a:font script="Bugi" typeface="Leelawadee UI"/>
+        <a:font script="Bopo" typeface="Microsoft JhengHei"/>
+        <a:font script="Java" typeface="Javanese Text"/>
+        <a:font script="Lisu" typeface="Segoe UI"/>
+        <a:font script="Mymr" typeface="Myanmar Text"/>
+        <a:font script="Nkoo" typeface="Ebrima"/>
+        <a:font script="Olck" typeface="Nirmala UI"/>
+        <a:font script="Osma" typeface="Ebrima"/>
+        <a:font script="Phag" typeface="Phagspa"/>
+        <a:font script="Syrn" typeface="Estrangelo Edessa"/>
+        <a:font script="Syrj" typeface="Estrangelo Edessa"/>
+        <a:font script="Syre" typeface="Estrangelo Edessa"/>
+        <a:font script="Sora" typeface="Nirmala UI"/>
+        <a:font script="Tale" typeface="Microsoft Tai Le"/>
+        <a:font script="Talu" typeface="Microsoft New Tai Lue"/>
+        <a:font script="Tfng" typeface="Ebrima"/>
+      </a:minorFont>
+    </a:fontScheme>
+    <a:fmtScheme name="Office">
+      <a:fillStyleLst>
+        <a:solidFill>
+          <a:schemeClr val="phClr"/>
+        </a:solidFill>
+        <a:gradFill rotWithShape="1">
+          <a:gsLst>
+            <a:gs pos="0">
+              <a:schemeClr val="phClr">
+                <a:lumMod val="110000"/>
+                <a:satMod val="105000"/>
+                <a:tint val="67000"/>
+              </a:schemeClr>
+            </a:gs>
+            <a:gs pos="50000">
+              <a:schemeClr val="phClr">
+                <a:lumMod val="105000"/>
+                <a:satMod val="103000"/>
+                <a:tint val="73000"/>
+              </a:schemeClr>
+            </a:gs>
+            <a:gs pos="100000">
+              <a:schemeClr val="phClr">
+                <a:lumMod val="105000"/>
+                <a:satMod val="109000"/>
+                <a:tint val="81000"/>
+              </a:schemeClr>
+            </a:gs>
+          </a:gsLst>
+          <a:lin ang="5400000" scaled="0"/>
+        </a:gradFill>
+        <a:gradFill rotWithShape="1">
+          <a:gsLst>
+            <a:gs pos="0">
+              <a:schemeClr val="phClr">
+                <a:satMod val="103000"/>
+                <a:lumMod val="102000"/>
+                <a:tint val="94000"/>
+              </a:schemeClr>
+            </a:gs>
+            <a:gs pos="50000">
+              <a:schemeClr val="phClr">
+                <a:satMod val="110000"/>
+                <a:lumMod val="100000"/>
+                <a:shade val="100000"/>
+              </a:schemeClr>
+            </a:gs>
+            <a:gs pos="100000">
+              <a:schemeClr val="phClr">
+                <a:lumMod val="99000"/>
+                <a:satMod val="120000"/>
+                <a:shade val="78000"/>
+              </a:schemeClr>
+            </a:gs>
+          </a:gsLst>
+          <a:lin ang="5400000" scaled="0"/>
+        </a:gradFill>
+      </a:fillStyleLst>
+      <a:lnStyleLst>
+        <a:ln w="12700" cap="flat" cmpd="sng" algn="ctr">
+          <a:solidFill>
+            <a:schemeClr val="phClr"/>
+          </a:solidFill>
+          <a:prstDash val="solid"/>
+          <a:miter lim="800000"/>
+        </a:ln>
+        <a:ln w="19050" cap="flat" cmpd="sng" algn="ctr">
+          <a:solidFill>
+            <a:schemeClr val="phClr"/>
+          </a:solidFill>
+          <a:prstDash val="solid"/>
+          <a:miter lim="800000"/>
+        </a:ln>
+        <a:ln w="25400" cap="flat" cmpd="sng" algn="ctr">
+          <a:solidFill>
+            <a:schemeClr val="phClr"/>
+          </a:solidFill>
+          <a:prstDash val="solid"/>
+          <a:miter lim="800000"/>
+        </a:ln>
+      </a:lnStyleLst>
+      <a:effectStyleLst>
+        <a:effectStyle>
+          <a:effectLst/>
+        </a:effectStyle>
+        <a:effectStyle>
+          <a:effectLst/>
+        </a:effectStyle>
+        <a:effectStyle>
+          <a:effectLst>
+            <a:outerShdw blurRad="57150" dist="19050" dir="5400000" algn="ctr" rotWithShape="0">
+              <a:srgbClr val="000000">
+                <a:alpha val="63000"/>
+              </a:srgbClr>
+            </a:outerShdw>
+          </a:effectLst>
+        </a:effectStyle>
+      </a:effectStyleLst>
+      <a:bgFillStyleLst>
+        <a:solidFill>
+          <a:schemeClr val="phClr"/>
+        </a:solidFill>
+        <a:solidFill>
+          <a:schemeClr val="phClr">
+            <a:tint val="95000"/>
+            <a:satMod val="170000"/>
+          </a:schemeClr>
+        </a:solidFill>
+        <a:gradFill rotWithShape="1">
+          <a:gsLst>
+            <a:gs pos="0">
+              <a:schemeClr val="phClr">
+                <a:tint val="93000"/>
+                <a:satMod val="150000"/>
+                <a:shade val="98000"/>
+                <a:lumMod val="102000"/>
+              </a:schemeClr>
+            </a:gs>
+            <a:gs pos="50000">
+              <a:schemeClr val="phClr">
+                <a:tint val="98000"/>
+                <a:satMod val="130000"/>
+                <a:shade val="90000"/>
+                <a:lumMod val="103000"/>
+              </a:schemeClr>
+            </a:gs>
+            <a:gs pos="100000">
+              <a:schemeClr val="phClr">
+                <a:shade val="63000"/>
+                <a:satMod val="120000"/>
+              </a:schemeClr>
+            </a:gs>
+          </a:gsLst>
+          <a:lin ang="5400000" scaled="0"/>
+        </a:gradFill>
+      </a:bgFillStyleLst>
+    </a:fmtScheme>
+  </a:themeElements>
+  <a:objectDefaults>
+    <a:lnDef>
+      <a:spPr/>
+      <a:bodyPr/>
+      <a:lstStyle/>
+      <a:style>
+        <a:lnRef idx="2">
+          <a:schemeClr val="accent1"/>
+        </a:lnRef>
+        <a:fillRef idx="0">
+          <a:schemeClr val="accent1"/>
+        </a:fillRef>
+        <a:effectRef idx="1">
+          <a:schemeClr val="accent1"/>
+        </a:effectRef>
+        <a:fontRef idx="minor">
+          <a:schemeClr val="tx1"/>
+        </a:fontRef>
+      </a:style>
+    </a:lnDef>
+  </a:objectDefaults>
+  <a:extraClrSchemeLst/>
+  <a:extLst>
+    <a:ext uri="{05A4C25C-085E-4340-85A3-A5531E510DB2}">
+      <thm15:themeFamily xmlns:thm15="http://schemas.microsoft.com/office/thememl/2012/main" name="Office Theme" id="{2E142A2C-CD16-42D6-873A-C26D2A0506FA}" vid="{1BDDFF52-6CD6-40A5-AB3C-68EB2F1E4D0A}"/>
+    </a:ext>
+  </a:extLst>
+</a:theme>
+</file>
+
 <file path=customXml/item1.xml><?xml version="1.0" encoding="utf-8"?>
+<p:properties xmlns:p="http://schemas.microsoft.com/office/2006/metadata/properties" xmlns:xsi="http://www.w3.org/2001/XMLSchema-instance" xmlns:pc="http://schemas.microsoft.com/office/infopath/2007/PartnerControls">
+  <documentManagement>
+    <_activity xmlns="0d9ec5f8-2dd8-4e62-9596-3147450cd266" xsi:nil="true"/>
+  </documentManagement>
+</p:properties>
+</file>
+
+<file path=customXml/item2.xml><?xml version="1.0" encoding="utf-8"?>
+<?mso-contentType ?>
+<FormTemplates xmlns="http://schemas.microsoft.com/sharepoint/v3/contenttype/forms">
+  <Display>DocumentLibraryForm</Display>
+  <Edit>DocumentLibraryForm</Edit>
+  <New>DocumentLibraryForm</New>
+</FormTemplates>
+</file>
+
+<file path=customXml/item3.xml><?xml version="1.0" encoding="utf-8"?>
 <ct:contentTypeSchema xmlns:ct="http://schemas.microsoft.com/office/2006/metadata/contentType" xmlns:ma="http://schemas.microsoft.com/office/2006/metadata/properties/metaAttributes" ct:_="" ma:_="" ma:contentTypeName="Document" ma:contentTypeID="0x010100048DB3F73D29FD439D45DB49E8F22F6F" ma:contentTypeVersion="17" ma:contentTypeDescription="Create a new document." ma:contentTypeScope="" ma:versionID="df8ea05f5e14a647312c69191883f445">
   <xsd:schema xmlns:xsd="http://www.w3.org/2001/XMLSchema" xmlns:xs="http://www.w3.org/2001/XMLSchema" xmlns:p="http://schemas.microsoft.com/office/2006/metadata/properties" xmlns:ns3="0d9ec5f8-2dd8-4e62-9596-3147450cd266" xmlns:ns4="f48ec59d-1461-4a76-a4f4-14b8a05189bb" targetNamespace="http://schemas.microsoft.com/office/2006/metadata/properties" ma:root="true" ma:fieldsID="f532eb55b6dff7be5c9ba953563b137a" ns3:_="" ns4:_="">
     <xsd:import namespace="0d9ec5f8-2dd8-4e62-9596-3147450cd266"/>
@@ -8351,24 +9110,32 @@
 </ct:contentTypeSchema>
 </file>
 
-<file path=customXml/item2.xml><?xml version="1.0" encoding="utf-8"?>
-<?mso-contentType ?>
-<FormTemplates xmlns="http://schemas.microsoft.com/sharepoint/v3/contenttype/forms">
-  <Display>DocumentLibraryForm</Display>
-  <Edit>DocumentLibraryForm</Edit>
-  <New>DocumentLibraryForm</New>
-</FormTemplates>
+<file path=customXml/itemProps1.xml><?xml version="1.0" encoding="utf-8"?>
+<ds:datastoreItem xmlns:ds="http://schemas.openxmlformats.org/officeDocument/2006/customXml" ds:itemID="{EF78CD88-E45C-452C-B644-0D3ABEE3634E}">
+  <ds:schemaRefs>
+    <ds:schemaRef ds:uri="http://purl.org/dc/elements/1.1/"/>
+    <ds:schemaRef ds:uri="http://schemas.microsoft.com/office/2006/documentManagement/types"/>
+    <ds:schemaRef ds:uri="http://purl.org/dc/dcmitype/"/>
+    <ds:schemaRef ds:uri="http://www.w3.org/XML/1998/namespace"/>
+    <ds:schemaRef ds:uri="http://purl.org/dc/terms/"/>
+    <ds:schemaRef ds:uri="http://schemas.microsoft.com/office/infopath/2007/PartnerControls"/>
+    <ds:schemaRef ds:uri="f48ec59d-1461-4a76-a4f4-14b8a05189bb"/>
+    <ds:schemaRef ds:uri="http://schemas.openxmlformats.org/package/2006/metadata/core-properties"/>
+    <ds:schemaRef ds:uri="0d9ec5f8-2dd8-4e62-9596-3147450cd266"/>
+    <ds:schemaRef ds:uri="http://schemas.microsoft.com/office/2006/metadata/properties"/>
+  </ds:schemaRefs>
+</ds:datastoreItem>
 </file>
 
-<file path=customXml/item3.xml><?xml version="1.0" encoding="utf-8"?>
-<p:properties xmlns:p="http://schemas.microsoft.com/office/2006/metadata/properties" xmlns:xsi="http://www.w3.org/2001/XMLSchema-instance" xmlns:pc="http://schemas.microsoft.com/office/infopath/2007/PartnerControls">
-  <documentManagement>
-    <_activity xmlns="0d9ec5f8-2dd8-4e62-9596-3147450cd266" xsi:nil="true"/>
-  </documentManagement>
-</p:properties>
+<file path=customXml/itemProps2.xml><?xml version="1.0" encoding="utf-8"?>
+<ds:datastoreItem xmlns:ds="http://schemas.openxmlformats.org/officeDocument/2006/customXml" ds:itemID="{6D5B1230-56AF-4247-8C83-47A044BBF626}">
+  <ds:schemaRefs>
+    <ds:schemaRef ds:uri="http://schemas.microsoft.com/sharepoint/v3/contenttype/forms"/>
+  </ds:schemaRefs>
+</ds:datastoreItem>
 </file>
 
-<file path=customXml/itemProps1.xml><?xml version="1.0" encoding="utf-8"?>
+<file path=customXml/itemProps3.xml><?xml version="1.0" encoding="utf-8"?>
 <ds:datastoreItem xmlns:ds="http://schemas.openxmlformats.org/officeDocument/2006/customXml" ds:itemID="{F82F45FB-365A-43B6-8A21-3420EF467609}">
   <ds:schemaRefs>
     <ds:schemaRef ds:uri="http://schemas.microsoft.com/office/2006/metadata/contentType"/>
@@ -8385,29 +9152,4 @@
     <ds:schemaRef ds:uri="http://schemas.microsoft.com/internal/obd"/>
   </ds:schemaRefs>
 </ds:datastoreItem>
-</file>
-
-<file path=customXml/itemProps2.xml><?xml version="1.0" encoding="utf-8"?>
-<ds:datastoreItem xmlns:ds="http://schemas.openxmlformats.org/officeDocument/2006/customXml" ds:itemID="{6D5B1230-56AF-4247-8C83-47A044BBF626}">
-  <ds:schemaRefs>
-    <ds:schemaRef ds:uri="http://schemas.microsoft.com/sharepoint/v3/contenttype/forms"/>
-  </ds:schemaRefs>
-</ds:datastoreItem>
-</file>
-
-<file path=customXml/itemProps3.xml><?xml version="1.0" encoding="utf-8"?>
-<ds:datastoreItem xmlns:ds="http://schemas.openxmlformats.org/officeDocument/2006/customXml" ds:itemID="{EF78CD88-E45C-452C-B644-0D3ABEE3634E}">
-  <ds:schemaRefs>
-    <ds:schemaRef ds:uri="http://purl.org/dc/elements/1.1/"/>
-    <ds:schemaRef ds:uri="http://schemas.microsoft.com/office/2006/documentManagement/types"/>
-    <ds:schemaRef ds:uri="http://purl.org/dc/dcmitype/"/>
-    <ds:schemaRef ds:uri="http://www.w3.org/XML/1998/namespace"/>
-    <ds:schemaRef ds:uri="http://purl.org/dc/terms/"/>
-    <ds:schemaRef ds:uri="http://schemas.microsoft.com/office/infopath/2007/PartnerControls"/>
-    <ds:schemaRef ds:uri="f48ec59d-1461-4a76-a4f4-14b8a05189bb"/>
-    <ds:schemaRef ds:uri="http://schemas.openxmlformats.org/package/2006/metadata/core-properties"/>
-    <ds:schemaRef ds:uri="0d9ec5f8-2dd8-4e62-9596-3147450cd266"/>
-    <ds:schemaRef ds:uri="http://schemas.microsoft.com/office/2006/metadata/properties"/>
-  </ds:schemaRefs>
-</ds:datastoreItem>
 </file>
</xml_diff>